<commit_message>
Update pres with DE
</commit_message>
<xml_diff>
--- a/linsley_postdoc/presentations/weekly_meetings/12_7_23.pptx
+++ b/linsley_postdoc/presentations/weekly_meetings/12_7_23.pptx
@@ -5,18 +5,19 @@
     <p:sldMasterId id="2147483648" r:id="rId1"/>
   </p:sldMasterIdLst>
   <p:notesMasterIdLst>
-    <p:notesMasterId r:id="rId11"/>
+    <p:notesMasterId r:id="rId12"/>
   </p:notesMasterIdLst>
   <p:sldIdLst>
     <p:sldId id="256" r:id="rId2"/>
     <p:sldId id="406" r:id="rId3"/>
     <p:sldId id="440" r:id="rId4"/>
-    <p:sldId id="444" r:id="rId5"/>
-    <p:sldId id="445" r:id="rId6"/>
-    <p:sldId id="442" r:id="rId7"/>
-    <p:sldId id="443" r:id="rId8"/>
-    <p:sldId id="441" r:id="rId9"/>
-    <p:sldId id="431" r:id="rId10"/>
+    <p:sldId id="446" r:id="rId5"/>
+    <p:sldId id="444" r:id="rId6"/>
+    <p:sldId id="445" r:id="rId7"/>
+    <p:sldId id="442" r:id="rId8"/>
+    <p:sldId id="443" r:id="rId9"/>
+    <p:sldId id="441" r:id="rId10"/>
+    <p:sldId id="447" r:id="rId11"/>
   </p:sldIdLst>
   <p:sldSz cx="12192000" cy="6858000"/>
   <p:notesSz cx="6858000" cy="9144000"/>
@@ -567,6 +568,96 @@
 </p:notes>
 </file>
 
+<file path=ppt/notesSlides/notesSlide10.xml><?xml version="1.0" encoding="utf-8"?>
+<p:notes xmlns:a="http://schemas.openxmlformats.org/drawingml/2006/main" xmlns:r="http://schemas.openxmlformats.org/officeDocument/2006/relationships" xmlns:p="http://schemas.openxmlformats.org/presentationml/2006/main">
+  <p:cSld>
+    <p:spTree>
+      <p:nvGrpSpPr>
+        <p:cNvPr id="1" name=""/>
+        <p:cNvGrpSpPr/>
+        <p:nvPr/>
+      </p:nvGrpSpPr>
+      <p:grpSpPr>
+        <a:xfrm>
+          <a:off x="0" y="0"/>
+          <a:ext cx="0" cy="0"/>
+          <a:chOff x="0" y="0"/>
+          <a:chExt cx="0" cy="0"/>
+        </a:xfrm>
+      </p:grpSpPr>
+      <p:sp>
+        <p:nvSpPr>
+          <p:cNvPr id="2" name="Slide Image Placeholder 1"/>
+          <p:cNvSpPr>
+            <a:spLocks noGrp="1" noRot="1" noChangeAspect="1"/>
+          </p:cNvSpPr>
+          <p:nvPr>
+            <p:ph type="sldImg"/>
+          </p:nvPr>
+        </p:nvSpPr>
+        <p:spPr/>
+      </p:sp>
+      <p:sp>
+        <p:nvSpPr>
+          <p:cNvPr id="3" name="Notes Placeholder 2"/>
+          <p:cNvSpPr>
+            <a:spLocks noGrp="1"/>
+          </p:cNvSpPr>
+          <p:nvPr>
+            <p:ph type="body" idx="1"/>
+          </p:nvPr>
+        </p:nvSpPr>
+        <p:spPr/>
+        <p:txBody>
+          <a:bodyPr/>
+          <a:lstStyle/>
+          <a:p>
+            <a:endParaRPr lang="en-US" b="0" i="0" u="none" strike="noStrike" dirty="0">
+              <a:solidFill>
+                <a:srgbClr val="212121"/>
+              </a:solidFill>
+              <a:effectLst/>
+              <a:latin typeface="Cambria" panose="02040503050406030204" pitchFamily="18" charset="0"/>
+            </a:endParaRPr>
+          </a:p>
+        </p:txBody>
+      </p:sp>
+      <p:sp>
+        <p:nvSpPr>
+          <p:cNvPr id="4" name="Slide Number Placeholder 3"/>
+          <p:cNvSpPr>
+            <a:spLocks noGrp="1"/>
+          </p:cNvSpPr>
+          <p:nvPr>
+            <p:ph type="sldNum" sz="quarter" idx="5"/>
+          </p:nvPr>
+        </p:nvSpPr>
+        <p:spPr/>
+        <p:txBody>
+          <a:bodyPr/>
+          <a:lstStyle/>
+          <a:p>
+            <a:fld id="{061BAA8C-FDC6-D345-B4E0-3B02449209FB}" type="slidenum">
+              <a:rPr lang="en-US" smtClean="0"/>
+              <a:t>10</a:t>
+            </a:fld>
+            <a:endParaRPr lang="en-US"/>
+          </a:p>
+        </p:txBody>
+      </p:sp>
+    </p:spTree>
+    <p:extLst>
+      <p:ext uri="{BB962C8B-B14F-4D97-AF65-F5344CB8AC3E}">
+        <p14:creationId xmlns:p14="http://schemas.microsoft.com/office/powerpoint/2010/main" val="3120086039"/>
+      </p:ext>
+    </p:extLst>
+  </p:cSld>
+  <p:clrMapOvr>
+    <a:masterClrMapping/>
+  </p:clrMapOvr>
+</p:notes>
+</file>
+
 <file path=ppt/notesSlides/notesSlide2.xml><?xml version="1.0" encoding="utf-8"?>
 <p:notes xmlns:a="http://schemas.openxmlformats.org/drawingml/2006/main" xmlns:r="http://schemas.openxmlformats.org/officeDocument/2006/relationships" xmlns:p="http://schemas.openxmlformats.org/presentationml/2006/main">
   <p:cSld>
@@ -697,13 +788,8 @@
           <a:p>
             <a:r>
               <a:rPr lang="en-US" dirty="0"/>
-              <a:t>Perhaps related to connection between infections before autoimmune development? Or </a:t>
-            </a:r>
-            <a:r>
-              <a:rPr lang="en-US"/>
-              <a:t>just bystanders?</a:t>
-            </a:r>
-            <a:endParaRPr lang="en-US" dirty="0"/>
+              <a:t>Perhaps related to connection between infections before autoimmune development? Or just bystanders?</a:t>
+            </a:r>
           </a:p>
           <a:p>
             <a:endParaRPr lang="en-US" dirty="0"/>
@@ -800,23 +886,80 @@
           <a:bodyPr/>
           <a:lstStyle/>
           <a:p>
-            <a:r>
-              <a:rPr lang="en-US" b="0" i="0" u="none" strike="noStrike" dirty="0" err="1">
-                <a:solidFill>
-                  <a:srgbClr val="212121"/>
-                </a:solidFill>
+            <a:pPr marL="0" marR="0" lvl="0" indent="0" algn="l" defTabSz="914400" rtl="0" eaLnBrk="1" fontAlgn="auto" latinLnBrk="0" hangingPunct="1">
+              <a:lnSpc>
+                <a:spcPct val="100000"/>
+              </a:lnSpc>
+              <a:spcBef>
+                <a:spcPts val="0"/>
+              </a:spcBef>
+              <a:spcAft>
+                <a:spcPts val="0"/>
+              </a:spcAft>
+              <a:buClrTx/>
+              <a:buSzTx/>
+              <a:buFontTx/>
+              <a:buNone/>
+              <a:tabLst/>
+              <a:defRPr/>
+            </a:pPr>
+            <a:r>
+              <a:rPr lang="en-US" dirty="0"/>
+              <a:t>took longest 50 and shortest 50 CDR3</a:t>
+            </a:r>
+            <a:r>
+              <a:rPr lang="el-GR" i="0" u="none" strike="noStrike" dirty="0">
                 <a:effectLst/>
-                <a:latin typeface="Cambria" panose="02040503050406030204" pitchFamily="18" charset="0"/>
               </a:rPr>
-              <a:t>Downsampled</a:t>
-            </a:r>
-            <a:endParaRPr lang="en-US" b="0" i="0" u="none" strike="noStrike" dirty="0">
-              <a:solidFill>
-                <a:srgbClr val="212121"/>
-              </a:solidFill>
-              <a:effectLst/>
-              <a:latin typeface="Cambria" panose="02040503050406030204" pitchFamily="18" charset="0"/>
-            </a:endParaRPr>
+              <a:t>β</a:t>
+            </a:r>
+            <a:r>
+              <a:rPr lang="en-US" dirty="0"/>
+              <a:t>s from CD8 T cells per patient</a:t>
+            </a:r>
+          </a:p>
+          <a:p>
+            <a:pPr marL="0" marR="0" lvl="0" indent="0" algn="l" defTabSz="914400" rtl="0" eaLnBrk="1" fontAlgn="auto" latinLnBrk="0" hangingPunct="1">
+              <a:lnSpc>
+                <a:spcPct val="100000"/>
+              </a:lnSpc>
+              <a:spcBef>
+                <a:spcPts val="0"/>
+              </a:spcBef>
+              <a:spcAft>
+                <a:spcPts val="0"/>
+              </a:spcAft>
+              <a:buClrTx/>
+              <a:buSzTx/>
+              <a:buFontTx/>
+              <a:buNone/>
+              <a:tabLst/>
+              <a:defRPr/>
+            </a:pPr>
+            <a:endParaRPr lang="en-US" dirty="0"/>
+          </a:p>
+          <a:p>
+            <a:pPr marL="0" marR="0" lvl="0" indent="0" algn="l" defTabSz="914400" rtl="0" eaLnBrk="1" fontAlgn="auto" latinLnBrk="0" hangingPunct="1">
+              <a:lnSpc>
+                <a:spcPct val="100000"/>
+              </a:lnSpc>
+              <a:spcBef>
+                <a:spcPts val="0"/>
+              </a:spcBef>
+              <a:spcAft>
+                <a:spcPts val="0"/>
+              </a:spcAft>
+              <a:buClrTx/>
+              <a:buSzTx/>
+              <a:buFontTx/>
+              <a:buNone/>
+              <a:tabLst/>
+              <a:defRPr/>
+            </a:pPr>
+            <a:r>
+              <a:rPr lang="en-US" dirty="0"/>
+              <a:t>KLRC2 is an NK-associated gene</a:t>
+            </a:r>
           </a:p>
         </p:txBody>
       </p:sp>
@@ -846,7 +989,7 @@
     </p:spTree>
     <p:extLst>
       <p:ext uri="{BB962C8B-B14F-4D97-AF65-F5344CB8AC3E}">
-        <p14:creationId xmlns:p14="http://schemas.microsoft.com/office/powerpoint/2010/main" val="131407720"/>
+        <p14:creationId xmlns:p14="http://schemas.microsoft.com/office/powerpoint/2010/main" val="1896488938"/>
       </p:ext>
     </p:extLst>
   </p:cSld>
@@ -900,23 +1043,6 @@
           <a:bodyPr/>
           <a:lstStyle/>
           <a:p>
-            <a:pPr marL="0" marR="0" lvl="0" indent="0" algn="l" defTabSz="914400" rtl="0" eaLnBrk="1" fontAlgn="auto" latinLnBrk="0" hangingPunct="1">
-              <a:lnSpc>
-                <a:spcPct val="100000"/>
-              </a:lnSpc>
-              <a:spcBef>
-                <a:spcPts val="0"/>
-              </a:spcBef>
-              <a:spcAft>
-                <a:spcPts val="0"/>
-              </a:spcAft>
-              <a:buClrTx/>
-              <a:buSzTx/>
-              <a:buFontTx/>
-              <a:buNone/>
-              <a:tabLst/>
-              <a:defRPr/>
-            </a:pPr>
             <a:r>
               <a:rPr lang="en-US" b="0" i="0" u="none" strike="noStrike" dirty="0" err="1">
                 <a:solidFill>
@@ -935,15 +1061,6 @@
               <a:latin typeface="Cambria" panose="02040503050406030204" pitchFamily="18" charset="0"/>
             </a:endParaRPr>
           </a:p>
-          <a:p>
-            <a:endParaRPr lang="en-US" b="0" i="0" u="none" strike="noStrike" dirty="0">
-              <a:solidFill>
-                <a:srgbClr val="212121"/>
-              </a:solidFill>
-              <a:effectLst/>
-              <a:latin typeface="Cambria" panose="02040503050406030204" pitchFamily="18" charset="0"/>
-            </a:endParaRPr>
-          </a:p>
         </p:txBody>
       </p:sp>
       <p:sp>
@@ -972,7 +1089,7 @@
     </p:spTree>
     <p:extLst>
       <p:ext uri="{BB962C8B-B14F-4D97-AF65-F5344CB8AC3E}">
-        <p14:creationId xmlns:p14="http://schemas.microsoft.com/office/powerpoint/2010/main" val="4017980013"/>
+        <p14:creationId xmlns:p14="http://schemas.microsoft.com/office/powerpoint/2010/main" val="131407720"/>
       </p:ext>
     </p:extLst>
   </p:cSld>
@@ -1061,6 +1178,15 @@
               <a:latin typeface="Cambria" panose="02040503050406030204" pitchFamily="18" charset="0"/>
             </a:endParaRPr>
           </a:p>
+          <a:p>
+            <a:endParaRPr lang="en-US" b="0" i="0" u="none" strike="noStrike" dirty="0">
+              <a:solidFill>
+                <a:srgbClr val="212121"/>
+              </a:solidFill>
+              <a:effectLst/>
+              <a:latin typeface="Cambria" panose="02040503050406030204" pitchFamily="18" charset="0"/>
+            </a:endParaRPr>
+          </a:p>
         </p:txBody>
       </p:sp>
       <p:sp>
@@ -1089,7 +1215,7 @@
     </p:spTree>
     <p:extLst>
       <p:ext uri="{BB962C8B-B14F-4D97-AF65-F5344CB8AC3E}">
-        <p14:creationId xmlns:p14="http://schemas.microsoft.com/office/powerpoint/2010/main" val="3195410651"/>
+        <p14:creationId xmlns:p14="http://schemas.microsoft.com/office/powerpoint/2010/main" val="4017980013"/>
       </p:ext>
     </p:extLst>
   </p:cSld>
@@ -1143,6 +1269,33 @@
           <a:bodyPr/>
           <a:lstStyle/>
           <a:p>
+            <a:pPr marL="0" marR="0" lvl="0" indent="0" algn="l" defTabSz="914400" rtl="0" eaLnBrk="1" fontAlgn="auto" latinLnBrk="0" hangingPunct="1">
+              <a:lnSpc>
+                <a:spcPct val="100000"/>
+              </a:lnSpc>
+              <a:spcBef>
+                <a:spcPts val="0"/>
+              </a:spcBef>
+              <a:spcAft>
+                <a:spcPts val="0"/>
+              </a:spcAft>
+              <a:buClrTx/>
+              <a:buSzTx/>
+              <a:buFontTx/>
+              <a:buNone/>
+              <a:tabLst/>
+              <a:defRPr/>
+            </a:pPr>
+            <a:r>
+              <a:rPr lang="en-US" b="0" i="0" u="none" strike="noStrike" dirty="0" err="1">
+                <a:solidFill>
+                  <a:srgbClr val="212121"/>
+                </a:solidFill>
+                <a:effectLst/>
+                <a:latin typeface="Cambria" panose="02040503050406030204" pitchFamily="18" charset="0"/>
+              </a:rPr>
+              <a:t>Downsampled</a:t>
+            </a:r>
             <a:endParaRPr lang="en-US" b="0" i="0" u="none" strike="noStrike" dirty="0">
               <a:solidFill>
                 <a:srgbClr val="212121"/>
@@ -1179,7 +1332,7 @@
     </p:spTree>
     <p:extLst>
       <p:ext uri="{BB962C8B-B14F-4D97-AF65-F5344CB8AC3E}">
-        <p14:creationId xmlns:p14="http://schemas.microsoft.com/office/powerpoint/2010/main" val="3087915680"/>
+        <p14:creationId xmlns:p14="http://schemas.microsoft.com/office/powerpoint/2010/main" val="3195410651"/>
       </p:ext>
     </p:extLst>
   </p:cSld>
@@ -1269,7 +1422,7 @@
     </p:spTree>
     <p:extLst>
       <p:ext uri="{BB962C8B-B14F-4D97-AF65-F5344CB8AC3E}">
-        <p14:creationId xmlns:p14="http://schemas.microsoft.com/office/powerpoint/2010/main" val="3909315473"/>
+        <p14:creationId xmlns:p14="http://schemas.microsoft.com/office/powerpoint/2010/main" val="3087915680"/>
       </p:ext>
     </p:extLst>
   </p:cSld>
@@ -1323,23 +1476,6 @@
           <a:bodyPr/>
           <a:lstStyle/>
           <a:p>
-            <a:pPr marL="0" marR="0" lvl="0" indent="0" algn="l" defTabSz="914400" rtl="0" eaLnBrk="1" fontAlgn="auto" latinLnBrk="0" hangingPunct="1">
-              <a:lnSpc>
-                <a:spcPct val="100000"/>
-              </a:lnSpc>
-              <a:spcBef>
-                <a:spcPts val="0"/>
-              </a:spcBef>
-              <a:spcAft>
-                <a:spcPts val="0"/>
-              </a:spcAft>
-              <a:buClrTx/>
-              <a:buSzTx/>
-              <a:buFontTx/>
-              <a:buNone/>
-              <a:tabLst/>
-              <a:defRPr/>
-            </a:pPr>
             <a:endParaRPr lang="en-US" b="0" i="0" u="none" strike="noStrike" dirty="0">
               <a:solidFill>
                 <a:srgbClr val="212121"/>
@@ -1376,7 +1512,7 @@
     </p:spTree>
     <p:extLst>
       <p:ext uri="{BB962C8B-B14F-4D97-AF65-F5344CB8AC3E}">
-        <p14:creationId xmlns:p14="http://schemas.microsoft.com/office/powerpoint/2010/main" val="2401823960"/>
+        <p14:creationId xmlns:p14="http://schemas.microsoft.com/office/powerpoint/2010/main" val="3909315473"/>
       </p:ext>
     </p:extLst>
   </p:cSld>
@@ -4699,6 +4835,111 @@
 </p:sld>
 </file>
 
+<file path=ppt/slides/slide10.xml><?xml version="1.0" encoding="utf-8"?>
+<p:sld xmlns:a="http://schemas.openxmlformats.org/drawingml/2006/main" xmlns:r="http://schemas.openxmlformats.org/officeDocument/2006/relationships" xmlns:p="http://schemas.openxmlformats.org/presentationml/2006/main">
+  <p:cSld>
+    <p:spTree>
+      <p:nvGrpSpPr>
+        <p:cNvPr id="1" name=""/>
+        <p:cNvGrpSpPr/>
+        <p:nvPr/>
+      </p:nvGrpSpPr>
+      <p:grpSpPr>
+        <a:xfrm>
+          <a:off x="0" y="0"/>
+          <a:ext cx="0" cy="0"/>
+          <a:chOff x="0" y="0"/>
+          <a:chExt cx="0" cy="0"/>
+        </a:xfrm>
+      </p:grpSpPr>
+      <p:sp>
+        <p:nvSpPr>
+          <p:cNvPr id="2" name="Title 1">
+            <a:extLst>
+              <a:ext uri="{FF2B5EF4-FFF2-40B4-BE49-F238E27FC236}">
+                <a16:creationId xmlns:a16="http://schemas.microsoft.com/office/drawing/2014/main" id="{70A4C97D-8F21-3D3B-6A90-EA7145324964}"/>
+              </a:ext>
+            </a:extLst>
+          </p:cNvPr>
+          <p:cNvSpPr>
+            <a:spLocks noGrp="1"/>
+          </p:cNvSpPr>
+          <p:nvPr>
+            <p:ph type="title"/>
+          </p:nvPr>
+        </p:nvSpPr>
+        <p:spPr>
+          <a:xfrm>
+            <a:off x="838200" y="593725"/>
+            <a:ext cx="10515600" cy="1325563"/>
+          </a:xfrm>
+        </p:spPr>
+        <p:txBody>
+          <a:bodyPr>
+            <a:normAutofit/>
+          </a:bodyPr>
+          <a:lstStyle/>
+          <a:p>
+            <a:r>
+              <a:rPr lang="en-US" dirty="0"/>
+              <a:t>Next steps</a:t>
+            </a:r>
+          </a:p>
+        </p:txBody>
+      </p:sp>
+      <p:sp>
+        <p:nvSpPr>
+          <p:cNvPr id="3" name="Content Placeholder 2">
+            <a:extLst>
+              <a:ext uri="{FF2B5EF4-FFF2-40B4-BE49-F238E27FC236}">
+                <a16:creationId xmlns:a16="http://schemas.microsoft.com/office/drawing/2014/main" id="{B9501834-7B32-1ACA-4358-B630FB8EEC36}"/>
+              </a:ext>
+            </a:extLst>
+          </p:cNvPr>
+          <p:cNvSpPr>
+            <a:spLocks noGrp="1"/>
+          </p:cNvSpPr>
+          <p:nvPr>
+            <p:ph idx="1"/>
+          </p:nvPr>
+        </p:nvSpPr>
+        <p:spPr>
+          <a:xfrm>
+            <a:off x="838200" y="1919289"/>
+            <a:ext cx="10515600" cy="4623402"/>
+          </a:xfrm>
+        </p:spPr>
+        <p:txBody>
+          <a:bodyPr>
+            <a:normAutofit/>
+          </a:bodyPr>
+          <a:lstStyle/>
+          <a:p>
+            <a:r>
+              <a:rPr lang="en-US" dirty="0"/>
+              <a:t>Slowly beginning to assemble </a:t>
+            </a:r>
+            <a:r>
+              <a:rPr lang="en-US"/>
+              <a:t>SI presentation slides</a:t>
+            </a:r>
+            <a:endParaRPr lang="en-US" dirty="0"/>
+          </a:p>
+        </p:txBody>
+      </p:sp>
+    </p:spTree>
+    <p:extLst>
+      <p:ext uri="{BB962C8B-B14F-4D97-AF65-F5344CB8AC3E}">
+        <p14:creationId xmlns:p14="http://schemas.microsoft.com/office/powerpoint/2010/main" val="1944656713"/>
+      </p:ext>
+    </p:extLst>
+  </p:cSld>
+  <p:clrMapOvr>
+    <a:masterClrMapping/>
+  </p:clrMapOvr>
+</p:sld>
+</file>
+
 <file path=ppt/slides/slide2.xml><?xml version="1.0" encoding="utf-8"?>
 <p:sld xmlns:a="http://schemas.openxmlformats.org/drawingml/2006/main" xmlns:r="http://schemas.openxmlformats.org/officeDocument/2006/relationships" xmlns:p="http://schemas.openxmlformats.org/presentationml/2006/main">
   <p:cSld>
@@ -4946,12 +5187,57 @@
           <a:chExt cx="0" cy="0"/>
         </a:xfrm>
       </p:grpSpPr>
+      <p:sp>
+        <p:nvSpPr>
+          <p:cNvPr id="2" name="Title 1">
+            <a:extLst>
+              <a:ext uri="{FF2B5EF4-FFF2-40B4-BE49-F238E27FC236}">
+                <a16:creationId xmlns:a16="http://schemas.microsoft.com/office/drawing/2014/main" id="{70A4C97D-8F21-3D3B-6A90-EA7145324964}"/>
+              </a:ext>
+            </a:extLst>
+          </p:cNvPr>
+          <p:cNvSpPr>
+            <a:spLocks noGrp="1"/>
+          </p:cNvSpPr>
+          <p:nvPr>
+            <p:ph type="title"/>
+          </p:nvPr>
+        </p:nvSpPr>
+        <p:spPr>
+          <a:xfrm>
+            <a:off x="838200" y="593725"/>
+            <a:ext cx="10515600" cy="1325563"/>
+          </a:xfrm>
+        </p:spPr>
+        <p:txBody>
+          <a:bodyPr>
+            <a:normAutofit fontScale="90000"/>
+          </a:bodyPr>
+          <a:lstStyle/>
+          <a:p>
+            <a:r>
+              <a:rPr lang="en-US" dirty="0"/>
+              <a:t>KLRC2 is the only gene significantly differentially expressed between longest and shortest CDR3</a:t>
+            </a:r>
+            <a:r>
+              <a:rPr lang="el-GR" i="0" u="none" strike="noStrike" dirty="0">
+                <a:effectLst/>
+              </a:rPr>
+              <a:t>β</a:t>
+            </a:r>
+            <a:r>
+              <a:rPr lang="en-US" dirty="0"/>
+              <a:t> CD8 T cells</a:t>
+            </a:r>
+          </a:p>
+        </p:txBody>
+      </p:sp>
       <p:pic>
         <p:nvPicPr>
-          <p:cNvPr id="18" name="Picture 17">
-            <a:extLst>
-              <a:ext uri="{FF2B5EF4-FFF2-40B4-BE49-F238E27FC236}">
-                <a16:creationId xmlns:a16="http://schemas.microsoft.com/office/drawing/2014/main" id="{B19D1C22-7A6E-82EC-A5CC-9CBD412AA209}"/>
+          <p:cNvPr id="3" name="Picture 2">
+            <a:extLst>
+              <a:ext uri="{FF2B5EF4-FFF2-40B4-BE49-F238E27FC236}">
+                <a16:creationId xmlns:a16="http://schemas.microsoft.com/office/drawing/2014/main" id="{FC14FD69-ADF5-FB15-EE0D-F8ED6ACFD219}"/>
               </a:ext>
             </a:extLst>
           </p:cNvPr>
@@ -4968,8 +5254,8 @@
         </p:blipFill>
         <p:spPr>
           <a:xfrm>
-            <a:off x="2456655" y="1820499"/>
-            <a:ext cx="7022690" cy="4350690"/>
+            <a:off x="1884680" y="1667449"/>
+            <a:ext cx="7772400" cy="4884541"/>
           </a:xfrm>
           <a:prstGeom prst="rect">
             <a:avLst/>
@@ -4978,109 +5264,19 @@
       </p:pic>
       <p:sp>
         <p:nvSpPr>
-          <p:cNvPr id="2" name="Title 1">
-            <a:extLst>
-              <a:ext uri="{FF2B5EF4-FFF2-40B4-BE49-F238E27FC236}">
-                <a16:creationId xmlns:a16="http://schemas.microsoft.com/office/drawing/2014/main" id="{70A4C97D-8F21-3D3B-6A90-EA7145324964}"/>
-              </a:ext>
-            </a:extLst>
-          </p:cNvPr>
-          <p:cNvSpPr>
-            <a:spLocks noGrp="1"/>
-          </p:cNvSpPr>
-          <p:nvPr>
-            <p:ph type="title"/>
-          </p:nvPr>
+          <p:cNvPr id="7" name="TextBox 6">
+            <a:extLst>
+              <a:ext uri="{FF2B5EF4-FFF2-40B4-BE49-F238E27FC236}">
+                <a16:creationId xmlns:a16="http://schemas.microsoft.com/office/drawing/2014/main" id="{6089C19B-9D02-C492-1B63-CD2B7DE152F1}"/>
+              </a:ext>
+            </a:extLst>
+          </p:cNvPr>
+          <p:cNvSpPr txBox="1"/>
+          <p:nvPr/>
         </p:nvSpPr>
         <p:spPr>
           <a:xfrm>
-            <a:off x="838200" y="593725"/>
-            <a:ext cx="10515600" cy="1325563"/>
-          </a:xfrm>
-        </p:spPr>
-        <p:txBody>
-          <a:bodyPr>
-            <a:normAutofit/>
-          </a:bodyPr>
-          <a:lstStyle/>
-          <a:p>
-            <a:r>
-              <a:rPr lang="en-US" dirty="0"/>
-              <a:t>Solid conclusion #1 from myocarditis dataset: CD8 TEM CDRBs longer in those developing </a:t>
-            </a:r>
-            <a:r>
-              <a:rPr lang="en-US" dirty="0" err="1"/>
-              <a:t>irAEs</a:t>
-            </a:r>
-            <a:endParaRPr lang="en-US" dirty="0"/>
-          </a:p>
-        </p:txBody>
-      </p:sp>
-      <p:sp>
-        <p:nvSpPr>
-          <p:cNvPr id="6" name="TextBox 5">
-            <a:extLst>
-              <a:ext uri="{FF2B5EF4-FFF2-40B4-BE49-F238E27FC236}">
-                <a16:creationId xmlns:a16="http://schemas.microsoft.com/office/drawing/2014/main" id="{3BDDC9E1-1BDF-7B28-ABD4-4B71329FC18A}"/>
-              </a:ext>
-            </a:extLst>
-          </p:cNvPr>
-          <p:cNvSpPr txBox="1"/>
-          <p:nvPr/>
-        </p:nvSpPr>
-        <p:spPr>
-          <a:xfrm>
-            <a:off x="4131818" y="5777384"/>
-            <a:ext cx="1290812" cy="646331"/>
-          </a:xfrm>
-          <a:prstGeom prst="rect">
-            <a:avLst/>
-          </a:prstGeom>
-          <a:noFill/>
-        </p:spPr>
-        <p:txBody>
-          <a:bodyPr wrap="square" rtlCol="0">
-            <a:spAutoFit/>
-          </a:bodyPr>
-          <a:lstStyle/>
-          <a:p>
-            <a:r>
-              <a:rPr lang="en-US" dirty="0">
-                <a:solidFill>
-                  <a:srgbClr val="F8766D"/>
-                </a:solidFill>
-              </a:rPr>
-              <a:t>n = 278</a:t>
-            </a:r>
-          </a:p>
-          <a:p>
-            <a:r>
-              <a:rPr lang="en-US" dirty="0">
-                <a:solidFill>
-                  <a:srgbClr val="06BFC4"/>
-                </a:solidFill>
-              </a:rPr>
-              <a:t>n = 816</a:t>
-            </a:r>
-            <a:endParaRPr lang="en-US" dirty="0"/>
-          </a:p>
-        </p:txBody>
-      </p:sp>
-      <p:sp>
-        <p:nvSpPr>
-          <p:cNvPr id="15" name="TextBox 14">
-            <a:extLst>
-              <a:ext uri="{FF2B5EF4-FFF2-40B4-BE49-F238E27FC236}">
-                <a16:creationId xmlns:a16="http://schemas.microsoft.com/office/drawing/2014/main" id="{681C603C-3660-F2A1-D833-46A82EBD2913}"/>
-              </a:ext>
-            </a:extLst>
-          </p:cNvPr>
-          <p:cNvSpPr txBox="1"/>
-          <p:nvPr/>
-        </p:nvSpPr>
-        <p:spPr>
-          <a:xfrm>
-            <a:off x="4480987" y="2428569"/>
+            <a:off x="3352800" y="2519680"/>
             <a:ext cx="415498" cy="369332"/>
           </a:xfrm>
           <a:prstGeom prst="rect">
@@ -5103,10 +5299,10 @@
       </p:sp>
       <p:sp>
         <p:nvSpPr>
-          <p:cNvPr id="17" name="TextBox 16">
-            <a:extLst>
-              <a:ext uri="{FF2B5EF4-FFF2-40B4-BE49-F238E27FC236}">
-                <a16:creationId xmlns:a16="http://schemas.microsoft.com/office/drawing/2014/main" id="{86D13063-5843-8710-C7CE-716C7FBA4392}"/>
+          <p:cNvPr id="8" name="TextBox 7">
+            <a:extLst>
+              <a:ext uri="{FF2B5EF4-FFF2-40B4-BE49-F238E27FC236}">
+                <a16:creationId xmlns:a16="http://schemas.microsoft.com/office/drawing/2014/main" id="{35D4832F-2155-236F-2961-9A7E4195BA8F}"/>
               </a:ext>
             </a:extLst>
           </p:cNvPr>
@@ -5115,8 +5311,8 @@
         </p:nvSpPr>
         <p:spPr>
           <a:xfrm>
-            <a:off x="2982247" y="6432422"/>
-            <a:ext cx="5971507" cy="369332"/>
+            <a:off x="2565687" y="6336268"/>
+            <a:ext cx="6777817" cy="369332"/>
           </a:xfrm>
           <a:prstGeom prst="rect">
             <a:avLst/>
@@ -5147,7 +5343,61 @@
                 <a:ea typeface="Calibri" panose="020F0502020204030204" pitchFamily="34" charset="0"/>
                 <a:cs typeface="Times New Roman" panose="02020603050405020304" pitchFamily="18" charset="0"/>
               </a:rPr>
-              <a:t>****, p &lt;1e-4; **, p &lt;1e-2; *; p &lt;0.05</a:t>
+              <a:t>****, </a:t>
+            </a:r>
+            <a:r>
+              <a:rPr lang="en-US" sz="1800" dirty="0" err="1">
+                <a:effectLst/>
+                <a:latin typeface="Calibri" panose="020F0502020204030204" pitchFamily="34" charset="0"/>
+                <a:ea typeface="Calibri" panose="020F0502020204030204" pitchFamily="34" charset="0"/>
+                <a:cs typeface="Times New Roman" panose="02020603050405020304" pitchFamily="18" charset="0"/>
+              </a:rPr>
+              <a:t>padj</a:t>
+            </a:r>
+            <a:r>
+              <a:rPr lang="en-US" sz="1800" dirty="0">
+                <a:effectLst/>
+                <a:latin typeface="Calibri" panose="020F0502020204030204" pitchFamily="34" charset="0"/>
+                <a:ea typeface="Calibri" panose="020F0502020204030204" pitchFamily="34" charset="0"/>
+                <a:cs typeface="Times New Roman" panose="02020603050405020304" pitchFamily="18" charset="0"/>
+              </a:rPr>
+              <a:t> &lt;1e-4; **, </a:t>
+            </a:r>
+            <a:r>
+              <a:rPr lang="en-US" sz="1800" dirty="0" err="1">
+                <a:effectLst/>
+                <a:latin typeface="Calibri" panose="020F0502020204030204" pitchFamily="34" charset="0"/>
+                <a:ea typeface="Calibri" panose="020F0502020204030204" pitchFamily="34" charset="0"/>
+                <a:cs typeface="Times New Roman" panose="02020603050405020304" pitchFamily="18" charset="0"/>
+              </a:rPr>
+              <a:t>padj</a:t>
+            </a:r>
+            <a:r>
+              <a:rPr lang="en-US" sz="1800" dirty="0">
+                <a:effectLst/>
+                <a:latin typeface="Calibri" panose="020F0502020204030204" pitchFamily="34" charset="0"/>
+                <a:ea typeface="Calibri" panose="020F0502020204030204" pitchFamily="34" charset="0"/>
+                <a:cs typeface="Times New Roman" panose="02020603050405020304" pitchFamily="18" charset="0"/>
+              </a:rPr>
+              <a:t> &lt;1e-2; *; </a:t>
+            </a:r>
+            <a:r>
+              <a:rPr lang="en-US" sz="1800" dirty="0" err="1">
+                <a:effectLst/>
+                <a:latin typeface="Calibri" panose="020F0502020204030204" pitchFamily="34" charset="0"/>
+                <a:ea typeface="Calibri" panose="020F0502020204030204" pitchFamily="34" charset="0"/>
+                <a:cs typeface="Times New Roman" panose="02020603050405020304" pitchFamily="18" charset="0"/>
+              </a:rPr>
+              <a:t>padj</a:t>
+            </a:r>
+            <a:r>
+              <a:rPr lang="en-US" sz="1800" dirty="0">
+                <a:effectLst/>
+                <a:latin typeface="Calibri" panose="020F0502020204030204" pitchFamily="34" charset="0"/>
+                <a:ea typeface="Calibri" panose="020F0502020204030204" pitchFamily="34" charset="0"/>
+                <a:cs typeface="Times New Roman" panose="02020603050405020304" pitchFamily="18" charset="0"/>
+              </a:rPr>
+              <a:t> &lt;0.05</a:t>
             </a:r>
             <a:endParaRPr lang="en-US" b="0" i="0" u="none" strike="noStrike" dirty="0">
               <a:solidFill>
@@ -5161,10 +5411,10 @@
       </p:sp>
       <p:sp>
         <p:nvSpPr>
-          <p:cNvPr id="19" name="TextBox 18">
-            <a:extLst>
-              <a:ext uri="{FF2B5EF4-FFF2-40B4-BE49-F238E27FC236}">
-                <a16:creationId xmlns:a16="http://schemas.microsoft.com/office/drawing/2014/main" id="{F3A90C1F-AE9E-9EBD-EEB6-323CA4738DD2}"/>
+          <p:cNvPr id="10" name="TextBox 9">
+            <a:extLst>
+              <a:ext uri="{FF2B5EF4-FFF2-40B4-BE49-F238E27FC236}">
+                <a16:creationId xmlns:a16="http://schemas.microsoft.com/office/drawing/2014/main" id="{391C22A2-DD50-EF1E-4ED4-FF2C0D0A9A80}"/>
               </a:ext>
             </a:extLst>
           </p:cNvPr>
@@ -5173,8 +5423,8 @@
         </p:nvSpPr>
         <p:spPr>
           <a:xfrm>
-            <a:off x="6772417" y="2428569"/>
-            <a:ext cx="415498" cy="369332"/>
+            <a:off x="9483868" y="6059269"/>
+            <a:ext cx="1102852" cy="646331"/>
           </a:xfrm>
           <a:prstGeom prst="rect">
             <a:avLst/>
@@ -5182,41 +5432,6 @@
           <a:noFill/>
         </p:spPr>
         <p:txBody>
-          <a:bodyPr wrap="none" rtlCol="0">
-            <a:spAutoFit/>
-          </a:bodyPr>
-          <a:lstStyle/>
-          <a:p>
-            <a:r>
-              <a:rPr lang="en-US" dirty="0"/>
-              <a:t>**</a:t>
-            </a:r>
-          </a:p>
-        </p:txBody>
-      </p:sp>
-      <p:sp>
-        <p:nvSpPr>
-          <p:cNvPr id="20" name="TextBox 19">
-            <a:extLst>
-              <a:ext uri="{FF2B5EF4-FFF2-40B4-BE49-F238E27FC236}">
-                <a16:creationId xmlns:a16="http://schemas.microsoft.com/office/drawing/2014/main" id="{01BCBE48-241E-8342-1DF8-CE59AE5E1549}"/>
-              </a:ext>
-            </a:extLst>
-          </p:cNvPr>
-          <p:cNvSpPr txBox="1"/>
-          <p:nvPr/>
-        </p:nvSpPr>
-        <p:spPr>
-          <a:xfrm>
-            <a:off x="6538831" y="5777385"/>
-            <a:ext cx="1290812" cy="646331"/>
-          </a:xfrm>
-          <a:prstGeom prst="rect">
-            <a:avLst/>
-          </a:prstGeom>
-          <a:noFill/>
-        </p:spPr>
-        <p:txBody>
           <a:bodyPr wrap="square" rtlCol="0">
             <a:spAutoFit/>
           </a:bodyPr>
@@ -5228,7 +5443,7 @@
                   <a:srgbClr val="F8766D"/>
                 </a:solidFill>
               </a:rPr>
-              <a:t>n = 50</a:t>
+              <a:t>n = 1,200</a:t>
             </a:r>
           </a:p>
           <a:p>
@@ -5238,7 +5453,7 @@
                   <a:srgbClr val="06BFC4"/>
                 </a:solidFill>
               </a:rPr>
-              <a:t>n = 306</a:t>
+              <a:t>n = 1,200</a:t>
             </a:r>
             <a:endParaRPr lang="en-US" dirty="0"/>
           </a:p>
@@ -5247,7 +5462,7 @@
     </p:spTree>
     <p:extLst>
       <p:ext uri="{BB962C8B-B14F-4D97-AF65-F5344CB8AC3E}">
-        <p14:creationId xmlns:p14="http://schemas.microsoft.com/office/powerpoint/2010/main" val="3710302815"/>
+        <p14:creationId xmlns:p14="http://schemas.microsoft.com/office/powerpoint/2010/main" val="4025578845"/>
       </p:ext>
     </p:extLst>
   </p:cSld>
@@ -5274,52 +5489,12 @@
           <a:chExt cx="0" cy="0"/>
         </a:xfrm>
       </p:grpSpPr>
-      <p:sp>
-        <p:nvSpPr>
-          <p:cNvPr id="2" name="Title 1">
-            <a:extLst>
-              <a:ext uri="{FF2B5EF4-FFF2-40B4-BE49-F238E27FC236}">
-                <a16:creationId xmlns:a16="http://schemas.microsoft.com/office/drawing/2014/main" id="{70A4C97D-8F21-3D3B-6A90-EA7145324964}"/>
-              </a:ext>
-            </a:extLst>
-          </p:cNvPr>
-          <p:cNvSpPr>
-            <a:spLocks noGrp="1"/>
-          </p:cNvSpPr>
-          <p:nvPr>
-            <p:ph type="title"/>
-          </p:nvPr>
-        </p:nvSpPr>
-        <p:spPr>
-          <a:xfrm>
-            <a:off x="838200" y="593725"/>
-            <a:ext cx="10515600" cy="1325563"/>
-          </a:xfrm>
-        </p:spPr>
-        <p:txBody>
-          <a:bodyPr>
-            <a:normAutofit/>
-          </a:bodyPr>
-          <a:lstStyle/>
-          <a:p>
-            <a:r>
-              <a:rPr lang="en-US" dirty="0"/>
-              <a:t>Solid conclusion #1 from myocarditis dataset: CD8 TEM TRBs less germline-like in those developing </a:t>
-            </a:r>
-            <a:r>
-              <a:rPr lang="en-US" dirty="0" err="1"/>
-              <a:t>irAEs</a:t>
-            </a:r>
-            <a:endParaRPr lang="en-US" dirty="0"/>
-          </a:p>
-        </p:txBody>
-      </p:sp>
       <p:pic>
         <p:nvPicPr>
-          <p:cNvPr id="29" name="Picture 28">
-            <a:extLst>
-              <a:ext uri="{FF2B5EF4-FFF2-40B4-BE49-F238E27FC236}">
-                <a16:creationId xmlns:a16="http://schemas.microsoft.com/office/drawing/2014/main" id="{018895C7-8357-4635-01F5-95F1B6050608}"/>
+          <p:cNvPr id="18" name="Picture 17">
+            <a:extLst>
+              <a:ext uri="{FF2B5EF4-FFF2-40B4-BE49-F238E27FC236}">
+                <a16:creationId xmlns:a16="http://schemas.microsoft.com/office/drawing/2014/main" id="{B19D1C22-7A6E-82EC-A5CC-9CBD412AA209}"/>
               </a:ext>
             </a:extLst>
           </p:cNvPr>
@@ -5336,8 +5511,8 @@
         </p:blipFill>
         <p:spPr>
           <a:xfrm>
-            <a:off x="2111477" y="1787548"/>
-            <a:ext cx="7071852" cy="4132099"/>
+            <a:off x="2456655" y="1820499"/>
+            <a:ext cx="7022690" cy="4350690"/>
           </a:xfrm>
           <a:prstGeom prst="rect">
             <a:avLst/>
@@ -5346,10 +5521,60 @@
       </p:pic>
       <p:sp>
         <p:nvSpPr>
-          <p:cNvPr id="30" name="TextBox 29">
-            <a:extLst>
-              <a:ext uri="{FF2B5EF4-FFF2-40B4-BE49-F238E27FC236}">
-                <a16:creationId xmlns:a16="http://schemas.microsoft.com/office/drawing/2014/main" id="{6AAB7E95-3129-265B-4691-B69F2ED9E1A6}"/>
+          <p:cNvPr id="2" name="Title 1">
+            <a:extLst>
+              <a:ext uri="{FF2B5EF4-FFF2-40B4-BE49-F238E27FC236}">
+                <a16:creationId xmlns:a16="http://schemas.microsoft.com/office/drawing/2014/main" id="{70A4C97D-8F21-3D3B-6A90-EA7145324964}"/>
+              </a:ext>
+            </a:extLst>
+          </p:cNvPr>
+          <p:cNvSpPr>
+            <a:spLocks noGrp="1"/>
+          </p:cNvSpPr>
+          <p:nvPr>
+            <p:ph type="title"/>
+          </p:nvPr>
+        </p:nvSpPr>
+        <p:spPr>
+          <a:xfrm>
+            <a:off x="838200" y="593725"/>
+            <a:ext cx="10515600" cy="1325563"/>
+          </a:xfrm>
+        </p:spPr>
+        <p:txBody>
+          <a:bodyPr>
+            <a:normAutofit/>
+          </a:bodyPr>
+          <a:lstStyle/>
+          <a:p>
+            <a:r>
+              <a:rPr lang="en-US" dirty="0"/>
+              <a:t>Solid conclusion #1 from myocarditis dataset: CD8 TEM CDR</a:t>
+            </a:r>
+            <a:r>
+              <a:rPr lang="el-GR" i="0" u="none" strike="noStrike" dirty="0">
+                <a:effectLst/>
+              </a:rPr>
+              <a:t>β</a:t>
+            </a:r>
+            <a:r>
+              <a:rPr lang="en-US" dirty="0"/>
+              <a:t>s longer in those developing </a:t>
+            </a:r>
+            <a:r>
+              <a:rPr lang="en-US" dirty="0" err="1"/>
+              <a:t>irAEs</a:t>
+            </a:r>
+            <a:endParaRPr lang="en-US" dirty="0"/>
+          </a:p>
+        </p:txBody>
+      </p:sp>
+      <p:sp>
+        <p:nvSpPr>
+          <p:cNvPr id="6" name="TextBox 5">
+            <a:extLst>
+              <a:ext uri="{FF2B5EF4-FFF2-40B4-BE49-F238E27FC236}">
+                <a16:creationId xmlns:a16="http://schemas.microsoft.com/office/drawing/2014/main" id="{3BDDC9E1-1BDF-7B28-ABD4-4B71329FC18A}"/>
               </a:ext>
             </a:extLst>
           </p:cNvPr>
@@ -5358,7 +5583,7 @@
         </p:nvSpPr>
         <p:spPr>
           <a:xfrm>
-            <a:off x="3954836" y="5777384"/>
+            <a:off x="4131818" y="5777384"/>
             <a:ext cx="1290812" cy="646331"/>
           </a:xfrm>
           <a:prstGeom prst="rect">
@@ -5396,10 +5621,10 @@
       </p:sp>
       <p:sp>
         <p:nvSpPr>
-          <p:cNvPr id="31" name="TextBox 30">
-            <a:extLst>
-              <a:ext uri="{FF2B5EF4-FFF2-40B4-BE49-F238E27FC236}">
-                <a16:creationId xmlns:a16="http://schemas.microsoft.com/office/drawing/2014/main" id="{586C4061-0208-CEA2-31EE-CFBAD992C396}"/>
+          <p:cNvPr id="15" name="TextBox 14">
+            <a:extLst>
+              <a:ext uri="{FF2B5EF4-FFF2-40B4-BE49-F238E27FC236}">
+                <a16:creationId xmlns:a16="http://schemas.microsoft.com/office/drawing/2014/main" id="{681C603C-3660-F2A1-D833-46A82EBD2913}"/>
               </a:ext>
             </a:extLst>
           </p:cNvPr>
@@ -5408,8 +5633,8 @@
         </p:nvSpPr>
         <p:spPr>
           <a:xfrm>
-            <a:off x="6361849" y="5777385"/>
-            <a:ext cx="1290812" cy="646331"/>
+            <a:off x="4480987" y="2428569"/>
+            <a:ext cx="415498" cy="369332"/>
           </a:xfrm>
           <a:prstGeom prst="rect">
             <a:avLst/>
@@ -5417,39 +5642,24 @@
           <a:noFill/>
         </p:spPr>
         <p:txBody>
-          <a:bodyPr wrap="square" rtlCol="0">
+          <a:bodyPr wrap="none" rtlCol="0">
             <a:spAutoFit/>
           </a:bodyPr>
           <a:lstStyle/>
           <a:p>
             <a:r>
-              <a:rPr lang="en-US" dirty="0">
-                <a:solidFill>
-                  <a:srgbClr val="F8766D"/>
-                </a:solidFill>
-              </a:rPr>
-              <a:t>n = 50</a:t>
-            </a:r>
-          </a:p>
-          <a:p>
-            <a:r>
-              <a:rPr lang="en-US" dirty="0">
-                <a:solidFill>
-                  <a:srgbClr val="06BFC4"/>
-                </a:solidFill>
-              </a:rPr>
-              <a:t>n = 306</a:t>
-            </a:r>
-            <a:endParaRPr lang="en-US" dirty="0"/>
-          </a:p>
-        </p:txBody>
-      </p:sp>
-      <p:sp>
-        <p:nvSpPr>
-          <p:cNvPr id="32" name="TextBox 31">
-            <a:extLst>
-              <a:ext uri="{FF2B5EF4-FFF2-40B4-BE49-F238E27FC236}">
-                <a16:creationId xmlns:a16="http://schemas.microsoft.com/office/drawing/2014/main" id="{3A388951-BAB4-7F25-2462-0E790BF12044}"/>
+              <a:rPr lang="en-US" dirty="0"/>
+              <a:t>**</a:t>
+            </a:r>
+          </a:p>
+        </p:txBody>
+      </p:sp>
+      <p:sp>
+        <p:nvSpPr>
+          <p:cNvPr id="17" name="TextBox 16">
+            <a:extLst>
+              <a:ext uri="{FF2B5EF4-FFF2-40B4-BE49-F238E27FC236}">
+                <a16:creationId xmlns:a16="http://schemas.microsoft.com/office/drawing/2014/main" id="{86D13063-5843-8710-C7CE-716C7FBA4392}"/>
               </a:ext>
             </a:extLst>
           </p:cNvPr>
@@ -5504,10 +5714,10 @@
       </p:sp>
       <p:sp>
         <p:nvSpPr>
-          <p:cNvPr id="33" name="TextBox 32">
-            <a:extLst>
-              <a:ext uri="{FF2B5EF4-FFF2-40B4-BE49-F238E27FC236}">
-                <a16:creationId xmlns:a16="http://schemas.microsoft.com/office/drawing/2014/main" id="{E6CDCD3A-7797-CFAA-E5C7-20E888508F16}"/>
+          <p:cNvPr id="19" name="TextBox 18">
+            <a:extLst>
+              <a:ext uri="{FF2B5EF4-FFF2-40B4-BE49-F238E27FC236}">
+                <a16:creationId xmlns:a16="http://schemas.microsoft.com/office/drawing/2014/main" id="{F3A90C1F-AE9E-9EBD-EEB6-323CA4738DD2}"/>
               </a:ext>
             </a:extLst>
           </p:cNvPr>
@@ -5516,8 +5726,8 @@
         </p:nvSpPr>
         <p:spPr>
           <a:xfrm>
-            <a:off x="6587613" y="2184908"/>
-            <a:ext cx="646331" cy="369332"/>
+            <a:off x="6772417" y="2428569"/>
+            <a:ext cx="415498" cy="369332"/>
           </a:xfrm>
           <a:prstGeom prst="rect">
             <a:avLst/>
@@ -5532,17 +5742,17 @@
           <a:p>
             <a:r>
               <a:rPr lang="en-US" dirty="0"/>
-              <a:t>****</a:t>
-            </a:r>
-          </a:p>
-        </p:txBody>
-      </p:sp>
-      <p:sp>
-        <p:nvSpPr>
-          <p:cNvPr id="34" name="TextBox 33">
-            <a:extLst>
-              <a:ext uri="{FF2B5EF4-FFF2-40B4-BE49-F238E27FC236}">
-                <a16:creationId xmlns:a16="http://schemas.microsoft.com/office/drawing/2014/main" id="{4F0A5ADB-B102-5D6D-CED8-AD8B2786B8DB}"/>
+              <a:t>**</a:t>
+            </a:r>
+          </a:p>
+        </p:txBody>
+      </p:sp>
+      <p:sp>
+        <p:nvSpPr>
+          <p:cNvPr id="20" name="TextBox 19">
+            <a:extLst>
+              <a:ext uri="{FF2B5EF4-FFF2-40B4-BE49-F238E27FC236}">
+                <a16:creationId xmlns:a16="http://schemas.microsoft.com/office/drawing/2014/main" id="{01BCBE48-241E-8342-1DF8-CE59AE5E1549}"/>
               </a:ext>
             </a:extLst>
           </p:cNvPr>
@@ -5551,8 +5761,8 @@
         </p:nvSpPr>
         <p:spPr>
           <a:xfrm>
-            <a:off x="4152969" y="2184908"/>
-            <a:ext cx="646331" cy="369332"/>
+            <a:off x="6538831" y="5777385"/>
+            <a:ext cx="1290812" cy="646331"/>
           </a:xfrm>
           <a:prstGeom prst="rect">
             <a:avLst/>
@@ -5560,22 +5770,37 @@
           <a:noFill/>
         </p:spPr>
         <p:txBody>
-          <a:bodyPr wrap="none" rtlCol="0">
+          <a:bodyPr wrap="square" rtlCol="0">
             <a:spAutoFit/>
           </a:bodyPr>
           <a:lstStyle/>
           <a:p>
             <a:r>
-              <a:rPr lang="en-US" dirty="0"/>
-              <a:t>****</a:t>
-            </a:r>
+              <a:rPr lang="en-US" dirty="0">
+                <a:solidFill>
+                  <a:srgbClr val="F8766D"/>
+                </a:solidFill>
+              </a:rPr>
+              <a:t>n = 50</a:t>
+            </a:r>
+          </a:p>
+          <a:p>
+            <a:r>
+              <a:rPr lang="en-US" dirty="0">
+                <a:solidFill>
+                  <a:srgbClr val="06BFC4"/>
+                </a:solidFill>
+              </a:rPr>
+              <a:t>n = 306</a:t>
+            </a:r>
+            <a:endParaRPr lang="en-US" dirty="0"/>
           </a:p>
         </p:txBody>
       </p:sp>
     </p:spTree>
     <p:extLst>
       <p:ext uri="{BB962C8B-B14F-4D97-AF65-F5344CB8AC3E}">
-        <p14:creationId xmlns:p14="http://schemas.microsoft.com/office/powerpoint/2010/main" val="2513826434"/>
+        <p14:creationId xmlns:p14="http://schemas.microsoft.com/office/powerpoint/2010/main" val="3710302815"/>
       </p:ext>
     </p:extLst>
   </p:cSld>
@@ -5632,7 +5857,7 @@
           <a:p>
             <a:r>
               <a:rPr lang="en-US" dirty="0"/>
-              <a:t>Somewhat solid conclusion #1 from myocarditis dataset: CD8 TCM CDR3Bs longer in those developing </a:t>
+              <a:t>Solid conclusion #1 from myocarditis dataset: CD8 TEM TRBs less germline-like in those developing </a:t>
             </a:r>
             <a:r>
               <a:rPr lang="en-US" dirty="0" err="1"/>
@@ -5644,10 +5869,10 @@
       </p:sp>
       <p:pic>
         <p:nvPicPr>
-          <p:cNvPr id="4" name="Picture 3">
-            <a:extLst>
-              <a:ext uri="{FF2B5EF4-FFF2-40B4-BE49-F238E27FC236}">
-                <a16:creationId xmlns:a16="http://schemas.microsoft.com/office/drawing/2014/main" id="{4DE8D106-B8ED-71AE-FA58-86D310C72E8E}"/>
+          <p:cNvPr id="29" name="Picture 28">
+            <a:extLst>
+              <a:ext uri="{FF2B5EF4-FFF2-40B4-BE49-F238E27FC236}">
+                <a16:creationId xmlns:a16="http://schemas.microsoft.com/office/drawing/2014/main" id="{018895C7-8357-4635-01F5-95F1B6050608}"/>
               </a:ext>
             </a:extLst>
           </p:cNvPr>
@@ -5664,8 +5889,8 @@
         </p:blipFill>
         <p:spPr>
           <a:xfrm>
-            <a:off x="2888216" y="2073648"/>
-            <a:ext cx="6147629" cy="3840040"/>
+            <a:off x="2111477" y="1787548"/>
+            <a:ext cx="7071852" cy="4132099"/>
           </a:xfrm>
           <a:prstGeom prst="rect">
             <a:avLst/>
@@ -5674,10 +5899,10 @@
       </p:pic>
       <p:sp>
         <p:nvSpPr>
-          <p:cNvPr id="5" name="TextBox 4">
-            <a:extLst>
-              <a:ext uri="{FF2B5EF4-FFF2-40B4-BE49-F238E27FC236}">
-                <a16:creationId xmlns:a16="http://schemas.microsoft.com/office/drawing/2014/main" id="{C90AA4EE-35AE-B8E5-FBAD-656ACCFB3681}"/>
+          <p:cNvPr id="30" name="TextBox 29">
+            <a:extLst>
+              <a:ext uri="{FF2B5EF4-FFF2-40B4-BE49-F238E27FC236}">
+                <a16:creationId xmlns:a16="http://schemas.microsoft.com/office/drawing/2014/main" id="{6AAB7E95-3129-265B-4691-B69F2ED9E1A6}"/>
               </a:ext>
             </a:extLst>
           </p:cNvPr>
@@ -5686,8 +5911,8 @@
         </p:nvSpPr>
         <p:spPr>
           <a:xfrm>
-            <a:off x="4536248" y="5854695"/>
-            <a:ext cx="3198159" cy="923330"/>
+            <a:off x="3954836" y="5777384"/>
+            <a:ext cx="1290812" cy="646331"/>
           </a:xfrm>
           <a:prstGeom prst="rect">
             <a:avLst/>
@@ -5701,26 +5926,12 @@
           <a:lstStyle/>
           <a:p>
             <a:r>
-              <a:rPr lang="en-US" dirty="0"/>
-              <a:t>CD8 TCM TRB </a:t>
-            </a:r>
-            <a:r>
-              <a:rPr lang="en-US" dirty="0" err="1"/>
-              <a:t>pval</a:t>
-            </a:r>
-            <a:r>
-              <a:rPr lang="en-US" dirty="0"/>
-              <a:t> = 0.08</a:t>
-            </a:r>
-          </a:p>
-          <a:p>
-            <a:r>
               <a:rPr lang="en-US" dirty="0">
                 <a:solidFill>
                   <a:srgbClr val="F8766D"/>
                 </a:solidFill>
               </a:rPr>
-              <a:t>n = 29</a:t>
+              <a:t>n = 278</a:t>
             </a:r>
           </a:p>
           <a:p>
@@ -5730,16 +5941,194 @@
                   <a:srgbClr val="06BFC4"/>
                 </a:solidFill>
               </a:rPr>
-              <a:t>n = 46</a:t>
+              <a:t>n = 816</a:t>
             </a:r>
             <a:endParaRPr lang="en-US" dirty="0"/>
+          </a:p>
+        </p:txBody>
+      </p:sp>
+      <p:sp>
+        <p:nvSpPr>
+          <p:cNvPr id="31" name="TextBox 30">
+            <a:extLst>
+              <a:ext uri="{FF2B5EF4-FFF2-40B4-BE49-F238E27FC236}">
+                <a16:creationId xmlns:a16="http://schemas.microsoft.com/office/drawing/2014/main" id="{586C4061-0208-CEA2-31EE-CFBAD992C396}"/>
+              </a:ext>
+            </a:extLst>
+          </p:cNvPr>
+          <p:cNvSpPr txBox="1"/>
+          <p:nvPr/>
+        </p:nvSpPr>
+        <p:spPr>
+          <a:xfrm>
+            <a:off x="6361849" y="5777385"/>
+            <a:ext cx="1290812" cy="646331"/>
+          </a:xfrm>
+          <a:prstGeom prst="rect">
+            <a:avLst/>
+          </a:prstGeom>
+          <a:noFill/>
+        </p:spPr>
+        <p:txBody>
+          <a:bodyPr wrap="square" rtlCol="0">
+            <a:spAutoFit/>
+          </a:bodyPr>
+          <a:lstStyle/>
+          <a:p>
+            <a:r>
+              <a:rPr lang="en-US" dirty="0">
+                <a:solidFill>
+                  <a:srgbClr val="F8766D"/>
+                </a:solidFill>
+              </a:rPr>
+              <a:t>n = 50</a:t>
+            </a:r>
+          </a:p>
+          <a:p>
+            <a:r>
+              <a:rPr lang="en-US" dirty="0">
+                <a:solidFill>
+                  <a:srgbClr val="06BFC4"/>
+                </a:solidFill>
+              </a:rPr>
+              <a:t>n = 306</a:t>
+            </a:r>
+            <a:endParaRPr lang="en-US" dirty="0"/>
+          </a:p>
+        </p:txBody>
+      </p:sp>
+      <p:sp>
+        <p:nvSpPr>
+          <p:cNvPr id="32" name="TextBox 31">
+            <a:extLst>
+              <a:ext uri="{FF2B5EF4-FFF2-40B4-BE49-F238E27FC236}">
+                <a16:creationId xmlns:a16="http://schemas.microsoft.com/office/drawing/2014/main" id="{3A388951-BAB4-7F25-2462-0E790BF12044}"/>
+              </a:ext>
+            </a:extLst>
+          </p:cNvPr>
+          <p:cNvSpPr txBox="1"/>
+          <p:nvPr/>
+        </p:nvSpPr>
+        <p:spPr>
+          <a:xfrm>
+            <a:off x="2982247" y="6432422"/>
+            <a:ext cx="5971507" cy="369332"/>
+          </a:xfrm>
+          <a:prstGeom prst="rect">
+            <a:avLst/>
+          </a:prstGeom>
+          <a:noFill/>
+        </p:spPr>
+        <p:txBody>
+          <a:bodyPr wrap="none" rtlCol="0">
+            <a:spAutoFit/>
+          </a:bodyPr>
+          <a:lstStyle/>
+          <a:p>
+            <a:r>
+              <a:rPr lang="en-US" dirty="0"/>
+              <a:t>Wilcoxon rank sum test.</a:t>
+            </a:r>
+            <a:r>
+              <a:rPr lang="en-US" dirty="0">
+                <a:latin typeface="Calibri" panose="020F0502020204030204" pitchFamily="34" charset="0"/>
+                <a:cs typeface="Times New Roman" panose="02020603050405020304" pitchFamily="18" charset="0"/>
+              </a:rPr>
+              <a:t> </a:t>
+            </a:r>
+            <a:r>
+              <a:rPr lang="en-US" sz="1800" dirty="0">
+                <a:effectLst/>
+                <a:latin typeface="Calibri" panose="020F0502020204030204" pitchFamily="34" charset="0"/>
+                <a:ea typeface="Calibri" panose="020F0502020204030204" pitchFamily="34" charset="0"/>
+                <a:cs typeface="Times New Roman" panose="02020603050405020304" pitchFamily="18" charset="0"/>
+              </a:rPr>
+              <a:t>****, p &lt;1e-4; **, p &lt;1e-2; *; p &lt;0.05</a:t>
+            </a:r>
+            <a:endParaRPr lang="en-US" b="0" i="0" u="none" strike="noStrike" dirty="0">
+              <a:solidFill>
+                <a:srgbClr val="212121"/>
+              </a:solidFill>
+              <a:effectLst/>
+              <a:latin typeface="Cambria" panose="02040503050406030204" pitchFamily="18" charset="0"/>
+            </a:endParaRPr>
+          </a:p>
+        </p:txBody>
+      </p:sp>
+      <p:sp>
+        <p:nvSpPr>
+          <p:cNvPr id="33" name="TextBox 32">
+            <a:extLst>
+              <a:ext uri="{FF2B5EF4-FFF2-40B4-BE49-F238E27FC236}">
+                <a16:creationId xmlns:a16="http://schemas.microsoft.com/office/drawing/2014/main" id="{E6CDCD3A-7797-CFAA-E5C7-20E888508F16}"/>
+              </a:ext>
+            </a:extLst>
+          </p:cNvPr>
+          <p:cNvSpPr txBox="1"/>
+          <p:nvPr/>
+        </p:nvSpPr>
+        <p:spPr>
+          <a:xfrm>
+            <a:off x="6587613" y="2184908"/>
+            <a:ext cx="646331" cy="369332"/>
+          </a:xfrm>
+          <a:prstGeom prst="rect">
+            <a:avLst/>
+          </a:prstGeom>
+          <a:noFill/>
+        </p:spPr>
+        <p:txBody>
+          <a:bodyPr wrap="none" rtlCol="0">
+            <a:spAutoFit/>
+          </a:bodyPr>
+          <a:lstStyle/>
+          <a:p>
+            <a:r>
+              <a:rPr lang="en-US" dirty="0"/>
+              <a:t>****</a:t>
+            </a:r>
+          </a:p>
+        </p:txBody>
+      </p:sp>
+      <p:sp>
+        <p:nvSpPr>
+          <p:cNvPr id="34" name="TextBox 33">
+            <a:extLst>
+              <a:ext uri="{FF2B5EF4-FFF2-40B4-BE49-F238E27FC236}">
+                <a16:creationId xmlns:a16="http://schemas.microsoft.com/office/drawing/2014/main" id="{4F0A5ADB-B102-5D6D-CED8-AD8B2786B8DB}"/>
+              </a:ext>
+            </a:extLst>
+          </p:cNvPr>
+          <p:cNvSpPr txBox="1"/>
+          <p:nvPr/>
+        </p:nvSpPr>
+        <p:spPr>
+          <a:xfrm>
+            <a:off x="4152969" y="2184908"/>
+            <a:ext cx="646331" cy="369332"/>
+          </a:xfrm>
+          <a:prstGeom prst="rect">
+            <a:avLst/>
+          </a:prstGeom>
+          <a:noFill/>
+        </p:spPr>
+        <p:txBody>
+          <a:bodyPr wrap="none" rtlCol="0">
+            <a:spAutoFit/>
+          </a:bodyPr>
+          <a:lstStyle/>
+          <a:p>
+            <a:r>
+              <a:rPr lang="en-US" dirty="0"/>
+              <a:t>****</a:t>
+            </a:r>
           </a:p>
         </p:txBody>
       </p:sp>
     </p:spTree>
     <p:extLst>
       <p:ext uri="{BB962C8B-B14F-4D97-AF65-F5344CB8AC3E}">
-        <p14:creationId xmlns:p14="http://schemas.microsoft.com/office/powerpoint/2010/main" val="2308986812"/>
+        <p14:creationId xmlns:p14="http://schemas.microsoft.com/office/powerpoint/2010/main" val="2513826434"/>
       </p:ext>
     </p:extLst>
   </p:cSld>
@@ -5796,50 +6185,124 @@
           <a:p>
             <a:r>
               <a:rPr lang="en-US" dirty="0"/>
-              <a:t>Unanswered questions from myocarditis dataset</a:t>
-            </a:r>
-          </a:p>
-        </p:txBody>
-      </p:sp>
-      <p:sp>
-        <p:nvSpPr>
-          <p:cNvPr id="3" name="Content Placeholder 2">
-            <a:extLst>
-              <a:ext uri="{FF2B5EF4-FFF2-40B4-BE49-F238E27FC236}">
-                <a16:creationId xmlns:a16="http://schemas.microsoft.com/office/drawing/2014/main" id="{B9501834-7B32-1ACA-4358-B630FB8EEC36}"/>
-              </a:ext>
-            </a:extLst>
-          </p:cNvPr>
-          <p:cNvSpPr>
-            <a:spLocks noGrp="1"/>
-          </p:cNvSpPr>
-          <p:nvPr>
-            <p:ph idx="1"/>
-          </p:nvPr>
-        </p:nvSpPr>
+              <a:t>Somewhat solid conclusion #1 from myocarditis dataset: CD8 TCM CDR3</a:t>
+            </a:r>
+            <a:r>
+              <a:rPr lang="el-GR" i="0" u="none" strike="noStrike" dirty="0">
+                <a:effectLst/>
+              </a:rPr>
+              <a:t>β</a:t>
+            </a:r>
+            <a:r>
+              <a:rPr lang="en-US" dirty="0"/>
+              <a:t>s longer in those developing </a:t>
+            </a:r>
+            <a:r>
+              <a:rPr lang="en-US" dirty="0" err="1"/>
+              <a:t>irAEs</a:t>
+            </a:r>
+            <a:endParaRPr lang="en-US" dirty="0"/>
+          </a:p>
+        </p:txBody>
+      </p:sp>
+      <p:pic>
+        <p:nvPicPr>
+          <p:cNvPr id="4" name="Picture 3">
+            <a:extLst>
+              <a:ext uri="{FF2B5EF4-FFF2-40B4-BE49-F238E27FC236}">
+                <a16:creationId xmlns:a16="http://schemas.microsoft.com/office/drawing/2014/main" id="{4DE8D106-B8ED-71AE-FA58-86D310C72E8E}"/>
+              </a:ext>
+            </a:extLst>
+          </p:cNvPr>
+          <p:cNvPicPr>
+            <a:picLocks noChangeAspect="1"/>
+          </p:cNvPicPr>
+          <p:nvPr/>
+        </p:nvPicPr>
+        <p:blipFill>
+          <a:blip r:embed="rId3"/>
+          <a:stretch>
+            <a:fillRect/>
+          </a:stretch>
+        </p:blipFill>
         <p:spPr>
           <a:xfrm>
-            <a:off x="838200" y="1919289"/>
-            <a:ext cx="10515600" cy="4623402"/>
+            <a:off x="2888216" y="2073648"/>
+            <a:ext cx="6147629" cy="3840040"/>
           </a:xfrm>
+          <a:prstGeom prst="rect">
+            <a:avLst/>
+          </a:prstGeom>
         </p:spPr>
-        <p:txBody>
-          <a:bodyPr>
-            <a:normAutofit/>
+      </p:pic>
+      <p:sp>
+        <p:nvSpPr>
+          <p:cNvPr id="5" name="TextBox 4">
+            <a:extLst>
+              <a:ext uri="{FF2B5EF4-FFF2-40B4-BE49-F238E27FC236}">
+                <a16:creationId xmlns:a16="http://schemas.microsoft.com/office/drawing/2014/main" id="{C90AA4EE-35AE-B8E5-FBAD-656ACCFB3681}"/>
+              </a:ext>
+            </a:extLst>
+          </p:cNvPr>
+          <p:cNvSpPr txBox="1"/>
+          <p:nvPr/>
+        </p:nvSpPr>
+        <p:spPr>
+          <a:xfrm>
+            <a:off x="4536248" y="5854695"/>
+            <a:ext cx="3198159" cy="923330"/>
+          </a:xfrm>
+          <a:prstGeom prst="rect">
+            <a:avLst/>
+          </a:prstGeom>
+          <a:noFill/>
+        </p:spPr>
+        <p:txBody>
+          <a:bodyPr wrap="square" rtlCol="0">
+            <a:spAutoFit/>
           </a:bodyPr>
           <a:lstStyle/>
           <a:p>
             <a:r>
               <a:rPr lang="en-US" dirty="0"/>
-              <a:t>Antigen specificities</a:t>
-            </a:r>
+              <a:t>CD8 TCM TRB </a:t>
+            </a:r>
+            <a:r>
+              <a:rPr lang="en-US" dirty="0" err="1"/>
+              <a:t>pval</a:t>
+            </a:r>
+            <a:r>
+              <a:rPr lang="en-US" dirty="0"/>
+              <a:t> = 0.08</a:t>
+            </a:r>
+          </a:p>
+          <a:p>
+            <a:r>
+              <a:rPr lang="en-US" dirty="0">
+                <a:solidFill>
+                  <a:srgbClr val="F8766D"/>
+                </a:solidFill>
+              </a:rPr>
+              <a:t>n = 29</a:t>
+            </a:r>
+          </a:p>
+          <a:p>
+            <a:r>
+              <a:rPr lang="en-US" dirty="0">
+                <a:solidFill>
+                  <a:srgbClr val="06BFC4"/>
+                </a:solidFill>
+              </a:rPr>
+              <a:t>n = 46</a:t>
+            </a:r>
+            <a:endParaRPr lang="en-US" dirty="0"/>
           </a:p>
         </p:txBody>
       </p:sp>
     </p:spTree>
     <p:extLst>
       <p:ext uri="{BB962C8B-B14F-4D97-AF65-F5344CB8AC3E}">
-        <p14:creationId xmlns:p14="http://schemas.microsoft.com/office/powerpoint/2010/main" val="758819144"/>
+        <p14:creationId xmlns:p14="http://schemas.microsoft.com/office/powerpoint/2010/main" val="2308986812"/>
       </p:ext>
     </p:extLst>
   </p:cSld>
@@ -5896,7 +6359,7 @@
           <a:p>
             <a:r>
               <a:rPr lang="en-US" dirty="0"/>
-              <a:t>Conclusions</a:t>
+              <a:t>Unanswered questions from myocarditis dataset</a:t>
             </a:r>
           </a:p>
         </p:txBody>
@@ -5929,14 +6392,17 @@
           </a:bodyPr>
           <a:lstStyle/>
           <a:p>
-            <a:endParaRPr lang="en-US" dirty="0"/>
+            <a:r>
+              <a:rPr lang="en-US" dirty="0"/>
+              <a:t>Antigen specificities</a:t>
+            </a:r>
           </a:p>
         </p:txBody>
       </p:sp>
     </p:spTree>
     <p:extLst>
       <p:ext uri="{BB962C8B-B14F-4D97-AF65-F5344CB8AC3E}">
-        <p14:creationId xmlns:p14="http://schemas.microsoft.com/office/powerpoint/2010/main" val="3813624599"/>
+        <p14:creationId xmlns:p14="http://schemas.microsoft.com/office/powerpoint/2010/main" val="758819144"/>
       </p:ext>
     </p:extLst>
   </p:cSld>
@@ -5993,7 +6459,7 @@
           <a:p>
             <a:r>
               <a:rPr lang="en-US" dirty="0"/>
-              <a:t>Next steps</a:t>
+              <a:t>Conclusions</a:t>
             </a:r>
           </a:p>
         </p:txBody>
@@ -6016,8 +6482,8 @@
         </p:nvSpPr>
         <p:spPr>
           <a:xfrm>
-            <a:off x="838199" y="1919289"/>
-            <a:ext cx="8834121" cy="4623402"/>
+            <a:off x="838200" y="1919289"/>
+            <a:ext cx="10515600" cy="4623402"/>
           </a:xfrm>
         </p:spPr>
         <p:txBody>
@@ -6026,7 +6492,6 @@
           </a:bodyPr>
           <a:lstStyle/>
           <a:p>
-            <a:pPr lvl="1"/>
             <a:endParaRPr lang="en-US" dirty="0"/>
           </a:p>
         </p:txBody>
@@ -6034,7 +6499,7 @@
     </p:spTree>
     <p:extLst>
       <p:ext uri="{BB962C8B-B14F-4D97-AF65-F5344CB8AC3E}">
-        <p14:creationId xmlns:p14="http://schemas.microsoft.com/office/powerpoint/2010/main" val="3672081665"/>
+        <p14:creationId xmlns:p14="http://schemas.microsoft.com/office/powerpoint/2010/main" val="3813624599"/>
       </p:ext>
     </p:extLst>
   </p:cSld>

</xml_diff>